<commit_message>
modify presentation by adding project goals
</commit_message>
<xml_diff>
--- a/frontend/presentation/Red_Sonics.pptx
+++ b/frontend/presentation/Red_Sonics.pptx
@@ -3515,12 +3515,20 @@
               </a:spcBef>
             </a:pPr>
             <a:r>
+              <a:rPr lang="hu-HU" sz="4800" dirty="0">
+                <a:latin typeface="Rockwell" panose="02060603020205020403" pitchFamily="18" charset="0"/>
+                <a:ea typeface="+mn-ea"/>
+                <a:cs typeface="+mn-cs"/>
+              </a:rPr>
+              <a:t>Display </a:t>
+            </a:r>
+            <a:r>
               <a:rPr lang="hu-HU" sz="4800" dirty="0" err="1">
                 <a:latin typeface="Rockwell" panose="02060603020205020403" pitchFamily="18" charset="0"/>
                 <a:ea typeface="+mn-ea"/>
                 <a:cs typeface="+mn-cs"/>
               </a:rPr>
-              <a:t>Search</a:t>
+              <a:t>weather</a:t>
             </a:r>
             <a:r>
               <a:rPr lang="hu-HU" sz="4800" dirty="0">
@@ -3536,7 +3544,7 @@
                 <a:ea typeface="+mn-ea"/>
                 <a:cs typeface="+mn-cs"/>
               </a:rPr>
-              <a:t>for</a:t>
+              <a:t>by</a:t>
             </a:r>
             <a:r>
               <a:rPr lang="hu-HU" sz="4800" dirty="0">
@@ -3544,7 +3552,7 @@
                 <a:ea typeface="+mn-ea"/>
                 <a:cs typeface="+mn-cs"/>
               </a:rPr>
-              <a:t> city </a:t>
+              <a:t> </a:t>
             </a:r>
             <a:r>
               <a:rPr lang="hu-HU" sz="4800" dirty="0" err="1">
@@ -3552,7 +3560,7 @@
                 <a:ea typeface="+mn-ea"/>
                 <a:cs typeface="+mn-cs"/>
               </a:rPr>
-              <a:t>name</a:t>
+              <a:t>cities</a:t>
             </a:r>
             <a:r>
               <a:rPr lang="hu-HU" sz="4800" dirty="0">
@@ -3575,7 +3583,7 @@
                 <a:ea typeface="+mn-ea"/>
                 <a:cs typeface="+mn-cs"/>
               </a:rPr>
-              <a:t>Create</a:t>
+              <a:t>Search</a:t>
             </a:r>
             <a:r>
               <a:rPr lang="hu-HU" sz="4800" dirty="0">
@@ -3591,7 +3599,7 @@
                 <a:ea typeface="+mn-ea"/>
                 <a:cs typeface="+mn-cs"/>
               </a:rPr>
-              <a:t>weather</a:t>
+              <a:t>for</a:t>
             </a:r>
             <a:r>
               <a:rPr lang="hu-HU" sz="4800" dirty="0">
@@ -3599,7 +3607,23 @@
                 <a:ea typeface="+mn-ea"/>
                 <a:cs typeface="+mn-cs"/>
               </a:rPr>
-              <a:t> app;</a:t>
+              <a:t> city </a:t>
+            </a:r>
+            <a:r>
+              <a:rPr lang="hu-HU" sz="4800" dirty="0" err="1">
+                <a:latin typeface="Rockwell" panose="02060603020205020403" pitchFamily="18" charset="0"/>
+                <a:ea typeface="+mn-ea"/>
+                <a:cs typeface="+mn-cs"/>
+              </a:rPr>
+              <a:t>name</a:t>
+            </a:r>
+            <a:r>
+              <a:rPr lang="hu-HU" sz="4800" dirty="0">
+                <a:latin typeface="Rockwell" panose="02060603020205020403" pitchFamily="18" charset="0"/>
+                <a:ea typeface="+mn-ea"/>
+                <a:cs typeface="+mn-cs"/>
+              </a:rPr>
+              <a:t>;</a:t>
             </a:r>
           </a:p>
         </p:txBody>
@@ -3622,8 +3646,8 @@
         </p:nvSpPr>
         <p:spPr>
           <a:xfrm>
-            <a:off x="3703663" y="524207"/>
-            <a:ext cx="4784675" cy="1314532"/>
+            <a:off x="4531122" y="524207"/>
+            <a:ext cx="3129756" cy="1314532"/>
           </a:xfrm>
           <a:prstGeom prst="roundRect">
             <a:avLst/>

</xml_diff>